<commit_message>
ajustes no voltar e apresentação
</commit_message>
<xml_diff>
--- a/frontend/src/AlphaMethics.pptx
+++ b/frontend/src/AlphaMethics.pptx
@@ -5,7 +5,7 @@
     <p:sldMasterId id="2147483677" r:id="rId1"/>
   </p:sldMasterIdLst>
   <p:notesMasterIdLst>
-    <p:notesMasterId r:id="rId12"/>
+    <p:notesMasterId r:id="rId13"/>
   </p:notesMasterIdLst>
   <p:sldIdLst>
     <p:sldId id="256" r:id="rId2"/>
@@ -13,11 +13,12 @@
     <p:sldId id="259" r:id="rId4"/>
     <p:sldId id="265" r:id="rId5"/>
     <p:sldId id="266" r:id="rId6"/>
-    <p:sldId id="267" r:id="rId7"/>
-    <p:sldId id="262" r:id="rId8"/>
-    <p:sldId id="263" r:id="rId9"/>
-    <p:sldId id="264" r:id="rId10"/>
-    <p:sldId id="260" r:id="rId11"/>
+    <p:sldId id="268" r:id="rId7"/>
+    <p:sldId id="267" r:id="rId8"/>
+    <p:sldId id="262" r:id="rId9"/>
+    <p:sldId id="263" r:id="rId10"/>
+    <p:sldId id="264" r:id="rId11"/>
+    <p:sldId id="260" r:id="rId12"/>
   </p:sldIdLst>
   <p:sldSz cx="12192000" cy="6858000"/>
   <p:notesSz cx="6858000" cy="9144000"/>
@@ -118,7 +119,7 @@
   </p:defaultTextStyle>
   <p:extLst>
     <p:ext uri="{EFAFB233-063F-42B5-8137-9DF3F51BA10A}">
-      <p15:sldGuideLst xmlns:p15="http://schemas.microsoft.com/office/powerpoint/2012/main">
+      <p15:sldGuideLst xmlns:p15="http://schemas.microsoft.com/office/powerpoint/2012/main" xmlns="">
         <p15:guide id="1" orient="horz" pos="2160">
           <p15:clr>
             <a:srgbClr val="A4A3A4"/>
@@ -217,7 +218,7 @@
           <a:p>
             <a:fld id="{024F84C8-0495-4F0A-858A-814B62DB822B}" type="datetimeFigureOut">
               <a:rPr lang="pt-BR" smtClean="0"/>
-              <a:t>20/03/2022</a:t>
+              <a:t>22/03/2022</a:t>
             </a:fld>
             <a:endParaRPr lang="pt-BR"/>
           </a:p>
@@ -1229,7 +1230,7 @@
           <a:p>
             <a:fld id="{82CFB029-ABBA-44DA-89A2-FD11FFCB9560}" type="datetimeFigureOut">
               <a:rPr lang="pt-BR" smtClean="0"/>
-              <a:t>20/03/2022</a:t>
+              <a:t>22/03/2022</a:t>
             </a:fld>
             <a:endParaRPr lang="pt-BR"/>
           </a:p>
@@ -1480,7 +1481,7 @@
           <a:p>
             <a:fld id="{82CFB029-ABBA-44DA-89A2-FD11FFCB9560}" type="datetimeFigureOut">
               <a:rPr lang="pt-BR" smtClean="0"/>
-              <a:t>20/03/2022</a:t>
+              <a:t>22/03/2022</a:t>
             </a:fld>
             <a:endParaRPr lang="pt-BR"/>
           </a:p>
@@ -1794,7 +1795,7 @@
           <a:p>
             <a:fld id="{82CFB029-ABBA-44DA-89A2-FD11FFCB9560}" type="datetimeFigureOut">
               <a:rPr lang="pt-BR" smtClean="0"/>
-              <a:t>20/03/2022</a:t>
+              <a:t>22/03/2022</a:t>
             </a:fld>
             <a:endParaRPr lang="pt-BR"/>
           </a:p>
@@ -2127,7 +2128,7 @@
           <a:p>
             <a:fld id="{82CFB029-ABBA-44DA-89A2-FD11FFCB9560}" type="datetimeFigureOut">
               <a:rPr lang="pt-BR" smtClean="0"/>
-              <a:t>20/03/2022</a:t>
+              <a:t>22/03/2022</a:t>
             </a:fld>
             <a:endParaRPr lang="pt-BR"/>
           </a:p>
@@ -2441,7 +2442,7 @@
           <a:p>
             <a:fld id="{82CFB029-ABBA-44DA-89A2-FD11FFCB9560}" type="datetimeFigureOut">
               <a:rPr lang="pt-BR" smtClean="0"/>
-              <a:t>20/03/2022</a:t>
+              <a:t>22/03/2022</a:t>
             </a:fld>
             <a:endParaRPr lang="pt-BR"/>
           </a:p>
@@ -2834,7 +2835,7 @@
           <a:p>
             <a:fld id="{82CFB029-ABBA-44DA-89A2-FD11FFCB9560}" type="datetimeFigureOut">
               <a:rPr lang="pt-BR" smtClean="0"/>
-              <a:t>20/03/2022</a:t>
+              <a:t>22/03/2022</a:t>
             </a:fld>
             <a:endParaRPr lang="pt-BR"/>
           </a:p>
@@ -3004,7 +3005,7 @@
           <a:p>
             <a:fld id="{82CFB029-ABBA-44DA-89A2-FD11FFCB9560}" type="datetimeFigureOut">
               <a:rPr lang="pt-BR" smtClean="0"/>
-              <a:t>20/03/2022</a:t>
+              <a:t>22/03/2022</a:t>
             </a:fld>
             <a:endParaRPr lang="pt-BR"/>
           </a:p>
@@ -3184,7 +3185,7 @@
           <a:p>
             <a:fld id="{82CFB029-ABBA-44DA-89A2-FD11FFCB9560}" type="datetimeFigureOut">
               <a:rPr lang="pt-BR" smtClean="0"/>
-              <a:t>20/03/2022</a:t>
+              <a:t>22/03/2022</a:t>
             </a:fld>
             <a:endParaRPr lang="pt-BR"/>
           </a:p>
@@ -3354,7 +3355,7 @@
           <a:p>
             <a:fld id="{82CFB029-ABBA-44DA-89A2-FD11FFCB9560}" type="datetimeFigureOut">
               <a:rPr lang="pt-BR" smtClean="0"/>
-              <a:t>20/03/2022</a:t>
+              <a:t>22/03/2022</a:t>
             </a:fld>
             <a:endParaRPr lang="pt-BR"/>
           </a:p>
@@ -3601,7 +3602,7 @@
           <a:p>
             <a:fld id="{82CFB029-ABBA-44DA-89A2-FD11FFCB9560}" type="datetimeFigureOut">
               <a:rPr lang="pt-BR" smtClean="0"/>
-              <a:t>20/03/2022</a:t>
+              <a:t>22/03/2022</a:t>
             </a:fld>
             <a:endParaRPr lang="pt-BR"/>
           </a:p>
@@ -3833,7 +3834,7 @@
           <a:p>
             <a:fld id="{82CFB029-ABBA-44DA-89A2-FD11FFCB9560}" type="datetimeFigureOut">
               <a:rPr lang="pt-BR" smtClean="0"/>
-              <a:t>20/03/2022</a:t>
+              <a:t>22/03/2022</a:t>
             </a:fld>
             <a:endParaRPr lang="pt-BR"/>
           </a:p>
@@ -4207,7 +4208,7 @@
           <a:p>
             <a:fld id="{82CFB029-ABBA-44DA-89A2-FD11FFCB9560}" type="datetimeFigureOut">
               <a:rPr lang="pt-BR" smtClean="0"/>
-              <a:t>20/03/2022</a:t>
+              <a:t>22/03/2022</a:t>
             </a:fld>
             <a:endParaRPr lang="pt-BR"/>
           </a:p>
@@ -4330,7 +4331,7 @@
           <a:p>
             <a:fld id="{82CFB029-ABBA-44DA-89A2-FD11FFCB9560}" type="datetimeFigureOut">
               <a:rPr lang="pt-BR" smtClean="0"/>
-              <a:t>20/03/2022</a:t>
+              <a:t>22/03/2022</a:t>
             </a:fld>
             <a:endParaRPr lang="pt-BR"/>
           </a:p>
@@ -4425,7 +4426,7 @@
           <a:p>
             <a:fld id="{82CFB029-ABBA-44DA-89A2-FD11FFCB9560}" type="datetimeFigureOut">
               <a:rPr lang="pt-BR" smtClean="0"/>
-              <a:t>20/03/2022</a:t>
+              <a:t>22/03/2022</a:t>
             </a:fld>
             <a:endParaRPr lang="pt-BR"/>
           </a:p>
@@ -4680,7 +4681,7 @@
           <a:p>
             <a:fld id="{82CFB029-ABBA-44DA-89A2-FD11FFCB9560}" type="datetimeFigureOut">
               <a:rPr lang="pt-BR" smtClean="0"/>
-              <a:t>20/03/2022</a:t>
+              <a:t>22/03/2022</a:t>
             </a:fld>
             <a:endParaRPr lang="pt-BR"/>
           </a:p>
@@ -4985,7 +4986,7 @@
           <a:p>
             <a:fld id="{82CFB029-ABBA-44DA-89A2-FD11FFCB9560}" type="datetimeFigureOut">
               <a:rPr lang="pt-BR" smtClean="0"/>
-              <a:t>20/03/2022</a:t>
+              <a:t>22/03/2022</a:t>
             </a:fld>
             <a:endParaRPr lang="pt-BR"/>
           </a:p>
@@ -5687,7 +5688,7 @@
           <a:p>
             <a:fld id="{82CFB029-ABBA-44DA-89A2-FD11FFCB9560}" type="datetimeFigureOut">
               <a:rPr lang="pt-BR" smtClean="0"/>
-              <a:t>20/03/2022</a:t>
+              <a:t>22/03/2022</a:t>
             </a:fld>
             <a:endParaRPr lang="pt-BR"/>
           </a:p>
@@ -6216,7 +6217,7 @@
           <p:cNvPr id="27" name="Imagem 26" descr="Texto&#10;&#10;Descrição gerada automaticamente">
             <a:extLst>
               <a:ext uri="{FF2B5EF4-FFF2-40B4-BE49-F238E27FC236}">
-                <a16:creationId xmlns:a16="http://schemas.microsoft.com/office/drawing/2014/main" id="{AC9EBBE3-9847-429B-A52E-06CF85F1D60D}"/>
+                <a16:creationId xmlns:a16="http://schemas.microsoft.com/office/drawing/2014/main" xmlns="" id="{AC9EBBE3-9847-429B-A52E-06CF85F1D60D}"/>
               </a:ext>
             </a:extLst>
           </p:cNvPr>
@@ -6252,7 +6253,7 @@
           <p:cNvPr id="2" name="Título 1">
             <a:extLst>
               <a:ext uri="{FF2B5EF4-FFF2-40B4-BE49-F238E27FC236}">
-                <a16:creationId xmlns:a16="http://schemas.microsoft.com/office/drawing/2014/main" id="{6CD0C7A6-D1FE-40CB-8245-46F65725E8B3}"/>
+                <a16:creationId xmlns:a16="http://schemas.microsoft.com/office/drawing/2014/main" xmlns="" id="{6CD0C7A6-D1FE-40CB-8245-46F65725E8B3}"/>
               </a:ext>
             </a:extLst>
           </p:cNvPr>
@@ -6311,7 +6312,7 @@
           <p:cNvPr id="3" name="Subtítulo 2">
             <a:extLst>
               <a:ext uri="{FF2B5EF4-FFF2-40B4-BE49-F238E27FC236}">
-                <a16:creationId xmlns:a16="http://schemas.microsoft.com/office/drawing/2014/main" id="{D7B28E2A-FD9B-4948-80A2-F291091C3FD2}"/>
+                <a16:creationId xmlns:a16="http://schemas.microsoft.com/office/drawing/2014/main" xmlns="" id="{D7B28E2A-FD9B-4948-80A2-F291091C3FD2}"/>
               </a:ext>
             </a:extLst>
           </p:cNvPr>
@@ -6349,7 +6350,7 @@
           <p:cNvPr id="15" name="Imagem 14" descr="Uma imagem contendo parede de papel, edifício, gaiola&#10;&#10;Descrição gerada automaticamente">
             <a:extLst>
               <a:ext uri="{FF2B5EF4-FFF2-40B4-BE49-F238E27FC236}">
-                <a16:creationId xmlns:a16="http://schemas.microsoft.com/office/drawing/2014/main" id="{06173D3A-3735-4AE0-B931-CD2AB0449C79}"/>
+                <a16:creationId xmlns:a16="http://schemas.microsoft.com/office/drawing/2014/main" xmlns="" id="{06173D3A-3735-4AE0-B931-CD2AB0449C79}"/>
               </a:ext>
             </a:extLst>
           </p:cNvPr>
@@ -6385,7 +6386,7 @@
           <p:cNvPr id="19" name="Imagem 18">
             <a:extLst>
               <a:ext uri="{FF2B5EF4-FFF2-40B4-BE49-F238E27FC236}">
-                <a16:creationId xmlns:a16="http://schemas.microsoft.com/office/drawing/2014/main" id="{7EB0E9EE-64CD-4680-9386-F9576446C13E}"/>
+                <a16:creationId xmlns:a16="http://schemas.microsoft.com/office/drawing/2014/main" xmlns="" id="{7EB0E9EE-64CD-4680-9386-F9576446C13E}"/>
               </a:ext>
             </a:extLst>
           </p:cNvPr>
@@ -6421,7 +6422,7 @@
           <p:cNvPr id="21" name="Imagem 20" descr="Imagem em branco e preto&#10;&#10;Descrição gerada automaticamente com confiança baixa">
             <a:extLst>
               <a:ext uri="{FF2B5EF4-FFF2-40B4-BE49-F238E27FC236}">
-                <a16:creationId xmlns:a16="http://schemas.microsoft.com/office/drawing/2014/main" id="{ED89BD05-7084-4B7C-AB35-07F939DCC55F}"/>
+                <a16:creationId xmlns:a16="http://schemas.microsoft.com/office/drawing/2014/main" xmlns="" id="{ED89BD05-7084-4B7C-AB35-07F939DCC55F}"/>
               </a:ext>
             </a:extLst>
           </p:cNvPr>
@@ -6457,7 +6458,7 @@
           <p:cNvPr id="23" name="Imagem 22">
             <a:extLst>
               <a:ext uri="{FF2B5EF4-FFF2-40B4-BE49-F238E27FC236}">
-                <a16:creationId xmlns:a16="http://schemas.microsoft.com/office/drawing/2014/main" id="{7DD01EF2-1111-43D9-9B8E-3634CCE565C7}"/>
+                <a16:creationId xmlns:a16="http://schemas.microsoft.com/office/drawing/2014/main" xmlns="" id="{7DD01EF2-1111-43D9-9B8E-3634CCE565C7}"/>
               </a:ext>
             </a:extLst>
           </p:cNvPr>
@@ -6493,7 +6494,7 @@
           <p:cNvPr id="25" name="Subtítulo 2">
             <a:extLst>
               <a:ext uri="{FF2B5EF4-FFF2-40B4-BE49-F238E27FC236}">
-                <a16:creationId xmlns:a16="http://schemas.microsoft.com/office/drawing/2014/main" id="{767CE302-B373-4844-8FD6-3C8EA5E9CFBE}"/>
+                <a16:creationId xmlns:a16="http://schemas.microsoft.com/office/drawing/2014/main" xmlns="" id="{767CE302-B373-4844-8FD6-3C8EA5E9CFBE}"/>
               </a:ext>
             </a:extLst>
           </p:cNvPr>
@@ -6875,6 +6876,90 @@
 <file path=ppt/slides/slide10.xml><?xml version="1.0" encoding="utf-8"?>
 <p:sld xmlns:a="http://schemas.openxmlformats.org/drawingml/2006/main" xmlns:r="http://schemas.openxmlformats.org/officeDocument/2006/relationships" xmlns:p="http://schemas.openxmlformats.org/presentationml/2006/main">
   <p:cSld>
+    <p:spTree>
+      <p:nvGrpSpPr>
+        <p:cNvPr id="1" name=""/>
+        <p:cNvGrpSpPr/>
+        <p:nvPr/>
+      </p:nvGrpSpPr>
+      <p:grpSpPr>
+        <a:xfrm>
+          <a:off x="0" y="0"/>
+          <a:ext cx="0" cy="0"/>
+          <a:chOff x="0" y="0"/>
+          <a:chExt cx="0" cy="0"/>
+        </a:xfrm>
+      </p:grpSpPr>
+      <p:pic>
+        <p:nvPicPr>
+          <p:cNvPr id="4098" name="Picture 2"/>
+          <p:cNvPicPr>
+            <a:picLocks noChangeAspect="1" noChangeArrowheads="1"/>
+          </p:cNvPicPr>
+          <p:nvPr/>
+        </p:nvPicPr>
+        <p:blipFill>
+          <a:blip r:embed="rId2">
+            <a:extLst>
+              <a:ext uri="{28A0092B-C50C-407E-A947-70E740481C1C}">
+                <a14:useLocalDpi xmlns:a14="http://schemas.microsoft.com/office/drawing/2010/main" val="0"/>
+              </a:ext>
+            </a:extLst>
+          </a:blip>
+          <a:srcRect/>
+          <a:stretch>
+            <a:fillRect/>
+          </a:stretch>
+        </p:blipFill>
+        <p:spPr bwMode="auto">
+          <a:xfrm>
+            <a:off x="-1" y="365760"/>
+            <a:ext cx="12181867" cy="6492239"/>
+          </a:xfrm>
+          <a:prstGeom prst="rect">
+            <a:avLst/>
+          </a:prstGeom>
+          <a:noFill/>
+          <a:ln>
+            <a:noFill/>
+          </a:ln>
+          <a:extLst>
+            <a:ext uri="{909E8E84-426E-40DD-AFC4-6F175D3DCCD1}">
+              <a14:hiddenFill xmlns:a14="http://schemas.microsoft.com/office/drawing/2010/main">
+                <a:solidFill>
+                  <a:schemeClr val="accent1"/>
+                </a:solidFill>
+              </a14:hiddenFill>
+            </a:ext>
+            <a:ext uri="{91240B29-F687-4F45-9708-019B960494DF}">
+              <a14:hiddenLine xmlns:a14="http://schemas.microsoft.com/office/drawing/2010/main" w="9525">
+                <a:solidFill>
+                  <a:schemeClr val="tx1"/>
+                </a:solidFill>
+                <a:miter lim="800000"/>
+                <a:headEnd/>
+                <a:tailEnd/>
+              </a14:hiddenLine>
+            </a:ext>
+          </a:extLst>
+        </p:spPr>
+      </p:pic>
+    </p:spTree>
+    <p:extLst>
+      <p:ext uri="{BB962C8B-B14F-4D97-AF65-F5344CB8AC3E}">
+        <p14:creationId xmlns:p14="http://schemas.microsoft.com/office/powerpoint/2010/main" val="2371170962"/>
+      </p:ext>
+    </p:extLst>
+  </p:cSld>
+  <p:clrMapOvr>
+    <a:masterClrMapping/>
+  </p:clrMapOvr>
+</p:sld>
+</file>
+
+<file path=ppt/slides/slide11.xml><?xml version="1.0" encoding="utf-8"?>
+<p:sld xmlns:a="http://schemas.openxmlformats.org/drawingml/2006/main" xmlns:r="http://schemas.openxmlformats.org/officeDocument/2006/relationships" xmlns:p="http://schemas.openxmlformats.org/presentationml/2006/main">
+  <p:cSld>
     <p:bg>
       <p:bgPr>
         <a:solidFill>
@@ -6902,10 +6987,10 @@
           <p:cNvPr id="35" name="Isosceles Triangle 34">
             <a:extLst>
               <a:ext uri="{FF2B5EF4-FFF2-40B4-BE49-F238E27FC236}">
-                <a16:creationId xmlns:a16="http://schemas.microsoft.com/office/drawing/2014/main" id="{ECD25CC7-FC66-488C-8D61-0FE7ECF1615F}"/>
+                <a16:creationId xmlns:a16="http://schemas.microsoft.com/office/drawing/2014/main" xmlns="" id="{ECD25CC7-FC66-488C-8D61-0FE7ECF1615F}"/>
               </a:ext>
               <a:ext uri="{C183D7F6-B498-43B3-948B-1728B52AA6E4}">
-                <adec:decorative xmlns:adec="http://schemas.microsoft.com/office/drawing/2017/decorative" val="1"/>
+                <adec:decorative xmlns:adec="http://schemas.microsoft.com/office/drawing/2017/decorative" xmlns="" val="1"/>
               </a:ext>
             </a:extLst>
           </p:cNvPr>
@@ -6915,7 +7000,7 @@
           <p:nvPr>
             <p:extLst>
               <p:ext uri="{386F3935-93C4-4BCD-93E2-E3B085C9AB24}">
-                <p16:designElem xmlns:p16="http://schemas.microsoft.com/office/powerpoint/2015/main" val="1"/>
+                <p16:designElem xmlns:p16="http://schemas.microsoft.com/office/powerpoint/2015/main" xmlns="" val="1"/>
               </p:ext>
             </p:extLst>
           </p:nvPr>
@@ -6958,7 +7043,7 @@
           <p:cNvPr id="9" name="Título 1">
             <a:extLst>
               <a:ext uri="{FF2B5EF4-FFF2-40B4-BE49-F238E27FC236}">
-                <a16:creationId xmlns:a16="http://schemas.microsoft.com/office/drawing/2014/main" id="{70B4B221-5D81-4972-91F7-30B97E5B012E}"/>
+                <a16:creationId xmlns:a16="http://schemas.microsoft.com/office/drawing/2014/main" xmlns="" id="{70B4B221-5D81-4972-91F7-30B97E5B012E}"/>
               </a:ext>
             </a:extLst>
           </p:cNvPr>
@@ -6996,7 +7081,7 @@
           <p:cNvPr id="11" name="Graphic 6" descr="Winking Face with No Fill">
             <a:extLst>
               <a:ext uri="{FF2B5EF4-FFF2-40B4-BE49-F238E27FC236}">
-                <a16:creationId xmlns:a16="http://schemas.microsoft.com/office/drawing/2014/main" id="{C477D084-7D3A-4CAE-BCAB-BB9D8EBAAC6B}"/>
+                <a16:creationId xmlns:a16="http://schemas.microsoft.com/office/drawing/2014/main" xmlns="" id="{C477D084-7D3A-4CAE-BCAB-BB9D8EBAAC6B}"/>
               </a:ext>
             </a:extLst>
           </p:cNvPr>
@@ -7012,7 +7097,7 @@
                 <a14:useLocalDpi xmlns:a14="http://schemas.microsoft.com/office/drawing/2010/main" val="0"/>
               </a:ext>
               <a:ext uri="{96DAC541-7B7A-43D3-8B79-37D633B846F1}">
-                <asvg:svgBlip xmlns:asvg="http://schemas.microsoft.com/office/drawing/2016/SVG/main" r:embed="rId3"/>
+                <asvg:svgBlip xmlns:asvg="http://schemas.microsoft.com/office/drawing/2016/SVG/main" xmlns="" r:embed="rId3"/>
               </a:ext>
             </a:extLst>
           </a:blip>
@@ -7035,7 +7120,7 @@
           <p:cNvPr id="12" name="Imagem 11" descr="Homem de camisa branca&#10;&#10;Descrição gerada automaticamente">
             <a:extLst>
               <a:ext uri="{FF2B5EF4-FFF2-40B4-BE49-F238E27FC236}">
-                <a16:creationId xmlns:a16="http://schemas.microsoft.com/office/drawing/2014/main" id="{B7D4013B-4CD0-46DF-A3AF-CA3CA2568FC2}"/>
+                <a16:creationId xmlns:a16="http://schemas.microsoft.com/office/drawing/2014/main" xmlns="" id="{B7D4013B-4CD0-46DF-A3AF-CA3CA2568FC2}"/>
               </a:ext>
             </a:extLst>
           </p:cNvPr>
@@ -7100,7 +7185,7 @@
           <p:cNvPr id="13" name="CaixaDeTexto 12">
             <a:extLst>
               <a:ext uri="{FF2B5EF4-FFF2-40B4-BE49-F238E27FC236}">
-                <a16:creationId xmlns:a16="http://schemas.microsoft.com/office/drawing/2014/main" id="{4A243D2E-6FF8-40DB-A22F-2BDB7D9BF89A}"/>
+                <a16:creationId xmlns:a16="http://schemas.microsoft.com/office/drawing/2014/main" xmlns="" id="{4A243D2E-6FF8-40DB-A22F-2BDB7D9BF89A}"/>
               </a:ext>
             </a:extLst>
           </p:cNvPr>
@@ -7141,7 +7226,7 @@
           <p:cNvPr id="16" name="Imagem 15">
             <a:extLst>
               <a:ext uri="{FF2B5EF4-FFF2-40B4-BE49-F238E27FC236}">
-                <a16:creationId xmlns:a16="http://schemas.microsoft.com/office/drawing/2014/main" id="{41CC7084-27C7-4AEC-B43D-92F83A8873F5}"/>
+                <a16:creationId xmlns:a16="http://schemas.microsoft.com/office/drawing/2014/main" xmlns="" id="{41CC7084-27C7-4AEC-B43D-92F83A8873F5}"/>
               </a:ext>
             </a:extLst>
           </p:cNvPr>
@@ -7206,7 +7291,7 @@
           <p:cNvPr id="17" name="CaixaDeTexto 16">
             <a:extLst>
               <a:ext uri="{FF2B5EF4-FFF2-40B4-BE49-F238E27FC236}">
-                <a16:creationId xmlns:a16="http://schemas.microsoft.com/office/drawing/2014/main" id="{D3369AD1-91B3-4BB1-ABF4-07CD83589E12}"/>
+                <a16:creationId xmlns:a16="http://schemas.microsoft.com/office/drawing/2014/main" xmlns="" id="{D3369AD1-91B3-4BB1-ABF4-07CD83589E12}"/>
               </a:ext>
             </a:extLst>
           </p:cNvPr>
@@ -7264,7 +7349,7 @@
           <p:cNvPr id="18" name="Imagem 17">
             <a:extLst>
               <a:ext uri="{FF2B5EF4-FFF2-40B4-BE49-F238E27FC236}">
-                <a16:creationId xmlns:a16="http://schemas.microsoft.com/office/drawing/2014/main" id="{8AC17BE4-839B-40F6-9B33-8B5C9DFC3FA4}"/>
+                <a16:creationId xmlns:a16="http://schemas.microsoft.com/office/drawing/2014/main" xmlns="" id="{8AC17BE4-839B-40F6-9B33-8B5C9DFC3FA4}"/>
               </a:ext>
             </a:extLst>
           </p:cNvPr>
@@ -7329,7 +7414,7 @@
           <p:cNvPr id="19" name="CaixaDeTexto 18">
             <a:extLst>
               <a:ext uri="{FF2B5EF4-FFF2-40B4-BE49-F238E27FC236}">
-                <a16:creationId xmlns:a16="http://schemas.microsoft.com/office/drawing/2014/main" id="{A941BF7F-FFB4-4067-B852-2D5AC2B5E60F}"/>
+                <a16:creationId xmlns:a16="http://schemas.microsoft.com/office/drawing/2014/main" xmlns="" id="{A941BF7F-FFB4-4067-B852-2D5AC2B5E60F}"/>
               </a:ext>
             </a:extLst>
           </p:cNvPr>
@@ -7377,7 +7462,7 @@
           <p:cNvPr id="20" name="Imagem 19">
             <a:extLst>
               <a:ext uri="{FF2B5EF4-FFF2-40B4-BE49-F238E27FC236}">
-                <a16:creationId xmlns:a16="http://schemas.microsoft.com/office/drawing/2014/main" id="{3D7C84DA-D0B8-4DC5-A9ED-EAAF209C14FD}"/>
+                <a16:creationId xmlns:a16="http://schemas.microsoft.com/office/drawing/2014/main" xmlns="" id="{3D7C84DA-D0B8-4DC5-A9ED-EAAF209C14FD}"/>
               </a:ext>
             </a:extLst>
           </p:cNvPr>
@@ -7442,7 +7527,7 @@
           <p:cNvPr id="21" name="CaixaDeTexto 20">
             <a:extLst>
               <a:ext uri="{FF2B5EF4-FFF2-40B4-BE49-F238E27FC236}">
-                <a16:creationId xmlns:a16="http://schemas.microsoft.com/office/drawing/2014/main" id="{099E56DB-7093-4781-B67E-27145FEAFA14}"/>
+                <a16:creationId xmlns:a16="http://schemas.microsoft.com/office/drawing/2014/main" xmlns="" id="{099E56DB-7093-4781-B67E-27145FEAFA14}"/>
               </a:ext>
             </a:extLst>
           </p:cNvPr>
@@ -7483,7 +7568,7 @@
           <p:cNvPr id="22" name="Imagem 21">
             <a:extLst>
               <a:ext uri="{FF2B5EF4-FFF2-40B4-BE49-F238E27FC236}">
-                <a16:creationId xmlns:a16="http://schemas.microsoft.com/office/drawing/2014/main" id="{0E895B79-9C56-4570-A598-D672EAD12807}"/>
+                <a16:creationId xmlns:a16="http://schemas.microsoft.com/office/drawing/2014/main" xmlns="" id="{0E895B79-9C56-4570-A598-D672EAD12807}"/>
               </a:ext>
             </a:extLst>
           </p:cNvPr>
@@ -7548,7 +7633,7 @@
           <p:cNvPr id="23" name="CaixaDeTexto 22">
             <a:extLst>
               <a:ext uri="{FF2B5EF4-FFF2-40B4-BE49-F238E27FC236}">
-                <a16:creationId xmlns:a16="http://schemas.microsoft.com/office/drawing/2014/main" id="{16830275-FD18-4AEA-BDA6-0CA87E6EADFB}"/>
+                <a16:creationId xmlns:a16="http://schemas.microsoft.com/office/drawing/2014/main" xmlns="" id="{16830275-FD18-4AEA-BDA6-0CA87E6EADFB}"/>
               </a:ext>
             </a:extLst>
           </p:cNvPr>
@@ -7619,7 +7704,7 @@
           <p:cNvPr id="2" name="Título 1">
             <a:extLst>
               <a:ext uri="{FF2B5EF4-FFF2-40B4-BE49-F238E27FC236}">
-                <a16:creationId xmlns:a16="http://schemas.microsoft.com/office/drawing/2014/main" id="{23A3DCD5-D15C-4CBF-97CE-F3870175B1E8}"/>
+                <a16:creationId xmlns:a16="http://schemas.microsoft.com/office/drawing/2014/main" xmlns="" id="{23A3DCD5-D15C-4CBF-97CE-F3870175B1E8}"/>
               </a:ext>
             </a:extLst>
           </p:cNvPr>
@@ -7687,7 +7772,7 @@
           <p:cNvPr id="5" name="Espaço Reservado para Conteúdo 4" descr="Logotipo&#10;&#10;Descrição gerada automaticamente">
             <a:extLst>
               <a:ext uri="{FF2B5EF4-FFF2-40B4-BE49-F238E27FC236}">
-                <a16:creationId xmlns:a16="http://schemas.microsoft.com/office/drawing/2014/main" id="{A3670E56-3DA2-41BC-A8AF-1D9E82B15A75}"/>
+                <a16:creationId xmlns:a16="http://schemas.microsoft.com/office/drawing/2014/main" xmlns="" id="{A3670E56-3DA2-41BC-A8AF-1D9E82B15A75}"/>
               </a:ext>
             </a:extLst>
           </p:cNvPr>
@@ -7729,7 +7814,7 @@
           <p:cNvPr id="7" name="Imagem 6" descr="Ícone&#10;&#10;Descrição gerada automaticamente">
             <a:extLst>
               <a:ext uri="{FF2B5EF4-FFF2-40B4-BE49-F238E27FC236}">
-                <a16:creationId xmlns:a16="http://schemas.microsoft.com/office/drawing/2014/main" id="{054E45A3-0347-4E70-939D-55F47533B05A}"/>
+                <a16:creationId xmlns:a16="http://schemas.microsoft.com/office/drawing/2014/main" xmlns="" id="{054E45A3-0347-4E70-939D-55F47533B05A}"/>
               </a:ext>
             </a:extLst>
           </p:cNvPr>
@@ -7772,7 +7857,7 @@
           <p:cNvPr id="9" name="Imagem 8" descr="Logotipo, Ícone&#10;&#10;Descrição gerada automaticamente">
             <a:extLst>
               <a:ext uri="{FF2B5EF4-FFF2-40B4-BE49-F238E27FC236}">
-                <a16:creationId xmlns:a16="http://schemas.microsoft.com/office/drawing/2014/main" id="{432FEFEC-AEC7-4D2F-8C97-FC7577151A80}"/>
+                <a16:creationId xmlns:a16="http://schemas.microsoft.com/office/drawing/2014/main" xmlns="" id="{432FEFEC-AEC7-4D2F-8C97-FC7577151A80}"/>
               </a:ext>
             </a:extLst>
           </p:cNvPr>
@@ -7815,7 +7900,7 @@
           <p:cNvPr id="11" name="Imagem 10" descr="Ícone&#10;&#10;Descrição gerada automaticamente">
             <a:extLst>
               <a:ext uri="{FF2B5EF4-FFF2-40B4-BE49-F238E27FC236}">
-                <a16:creationId xmlns:a16="http://schemas.microsoft.com/office/drawing/2014/main" id="{A172C2B7-8A69-46C2-8885-E8C023317FA8}"/>
+                <a16:creationId xmlns:a16="http://schemas.microsoft.com/office/drawing/2014/main" xmlns="" id="{A172C2B7-8A69-46C2-8885-E8C023317FA8}"/>
               </a:ext>
             </a:extLst>
           </p:cNvPr>
@@ -7858,7 +7943,7 @@
           <p:cNvPr id="15" name="Imagem 14" descr="Logotipo&#10;&#10;Descrição gerada automaticamente com confiança média">
             <a:extLst>
               <a:ext uri="{FF2B5EF4-FFF2-40B4-BE49-F238E27FC236}">
-                <a16:creationId xmlns:a16="http://schemas.microsoft.com/office/drawing/2014/main" id="{8C63FCAB-00E2-47A0-B29A-376B92307D48}"/>
+                <a16:creationId xmlns:a16="http://schemas.microsoft.com/office/drawing/2014/main" xmlns="" id="{8C63FCAB-00E2-47A0-B29A-376B92307D48}"/>
               </a:ext>
             </a:extLst>
           </p:cNvPr>
@@ -7901,7 +7986,7 @@
           <p:cNvPr id="17" name="Imagem 16" descr="Ícone&#10;&#10;Descrição gerada automaticamente">
             <a:extLst>
               <a:ext uri="{FF2B5EF4-FFF2-40B4-BE49-F238E27FC236}">
-                <a16:creationId xmlns:a16="http://schemas.microsoft.com/office/drawing/2014/main" id="{1D58B9D6-1F84-4A3B-A9E8-0EFF56E726B8}"/>
+                <a16:creationId xmlns:a16="http://schemas.microsoft.com/office/drawing/2014/main" xmlns="" id="{1D58B9D6-1F84-4A3B-A9E8-0EFF56E726B8}"/>
               </a:ext>
             </a:extLst>
           </p:cNvPr>
@@ -7944,7 +8029,7 @@
           <p:cNvPr id="19" name="Imagem 18" descr="Uma imagem contendo Ícone&#10;&#10;Descrição gerada automaticamente">
             <a:extLst>
               <a:ext uri="{FF2B5EF4-FFF2-40B4-BE49-F238E27FC236}">
-                <a16:creationId xmlns:a16="http://schemas.microsoft.com/office/drawing/2014/main" id="{79732F0E-4031-4229-BA2F-08DFD4918E04}"/>
+                <a16:creationId xmlns:a16="http://schemas.microsoft.com/office/drawing/2014/main" xmlns="" id="{79732F0E-4031-4229-BA2F-08DFD4918E04}"/>
               </a:ext>
             </a:extLst>
           </p:cNvPr>
@@ -7987,7 +8072,7 @@
           <p:cNvPr id="21" name="Imagem 20" descr="Ícone&#10;&#10;Descrição gerada automaticamente">
             <a:extLst>
               <a:ext uri="{FF2B5EF4-FFF2-40B4-BE49-F238E27FC236}">
-                <a16:creationId xmlns:a16="http://schemas.microsoft.com/office/drawing/2014/main" id="{C13826EB-1B23-4769-B818-2D957F8CC12D}"/>
+                <a16:creationId xmlns:a16="http://schemas.microsoft.com/office/drawing/2014/main" xmlns="" id="{C13826EB-1B23-4769-B818-2D957F8CC12D}"/>
               </a:ext>
             </a:extLst>
           </p:cNvPr>
@@ -8030,7 +8115,7 @@
           <p:cNvPr id="8" name="Imagem 7" descr="Forma&#10;&#10;Descrição gerada automaticamente com confiança baixa">
             <a:extLst>
               <a:ext uri="{FF2B5EF4-FFF2-40B4-BE49-F238E27FC236}">
-                <a16:creationId xmlns:a16="http://schemas.microsoft.com/office/drawing/2014/main" id="{FBF68665-C407-4A15-841F-ADBE7D104733}"/>
+                <a16:creationId xmlns:a16="http://schemas.microsoft.com/office/drawing/2014/main" xmlns="" id="{FBF68665-C407-4A15-841F-ADBE7D104733}"/>
               </a:ext>
             </a:extLst>
           </p:cNvPr>
@@ -8073,7 +8158,7 @@
           <p:cNvPr id="14" name="Imagem 13" descr="Logotipo&#10;&#10;Descrição gerada automaticamente">
             <a:extLst>
               <a:ext uri="{FF2B5EF4-FFF2-40B4-BE49-F238E27FC236}">
-                <a16:creationId xmlns:a16="http://schemas.microsoft.com/office/drawing/2014/main" id="{BF4E9D6D-F48D-462F-9048-721D0559B3CF}"/>
+                <a16:creationId xmlns:a16="http://schemas.microsoft.com/office/drawing/2014/main" xmlns="" id="{BF4E9D6D-F48D-462F-9048-721D0559B3CF}"/>
               </a:ext>
             </a:extLst>
           </p:cNvPr>
@@ -8154,7 +8239,7 @@
           <p:cNvPr id="7" name="Picture 2" descr="Montessori Basics: How Math Progresses Through the Levels | Hollis  Montessori School, NH">
             <a:extLst>
               <a:ext uri="{FF2B5EF4-FFF2-40B4-BE49-F238E27FC236}">
-                <a16:creationId xmlns:a16="http://schemas.microsoft.com/office/drawing/2014/main" id="{A88B4583-FAEB-4370-9A3A-97C09FF55B1D}"/>
+                <a16:creationId xmlns:a16="http://schemas.microsoft.com/office/drawing/2014/main" xmlns="" id="{A88B4583-FAEB-4370-9A3A-97C09FF55B1D}"/>
               </a:ext>
             </a:extLst>
           </p:cNvPr>
@@ -8226,10 +8311,10 @@
           <p:cNvPr id="35" name="Isosceles Triangle 34">
             <a:extLst>
               <a:ext uri="{FF2B5EF4-FFF2-40B4-BE49-F238E27FC236}">
-                <a16:creationId xmlns:a16="http://schemas.microsoft.com/office/drawing/2014/main" id="{ECD25CC7-FC66-488C-8D61-0FE7ECF1615F}"/>
+                <a16:creationId xmlns:a16="http://schemas.microsoft.com/office/drawing/2014/main" xmlns="" id="{ECD25CC7-FC66-488C-8D61-0FE7ECF1615F}"/>
               </a:ext>
               <a:ext uri="{C183D7F6-B498-43B3-948B-1728B52AA6E4}">
-                <adec:decorative xmlns:adec="http://schemas.microsoft.com/office/drawing/2017/decorative" val="1"/>
+                <adec:decorative xmlns:adec="http://schemas.microsoft.com/office/drawing/2017/decorative" xmlns="" val="1"/>
               </a:ext>
             </a:extLst>
           </p:cNvPr>
@@ -8239,7 +8324,7 @@
           <p:nvPr>
             <p:extLst>
               <p:ext uri="{386F3935-93C4-4BCD-93E2-E3B085C9AB24}">
-                <p16:designElem xmlns:p16="http://schemas.microsoft.com/office/powerpoint/2015/main" val="1"/>
+                <p16:designElem xmlns:p16="http://schemas.microsoft.com/office/powerpoint/2015/main" xmlns="" val="1"/>
               </p:ext>
             </p:extLst>
           </p:nvPr>
@@ -8282,7 +8367,7 @@
           <p:cNvPr id="32" name="Content Placeholder 31">
             <a:extLst>
               <a:ext uri="{FF2B5EF4-FFF2-40B4-BE49-F238E27FC236}">
-                <a16:creationId xmlns:a16="http://schemas.microsoft.com/office/drawing/2014/main" id="{A10D3B2E-58E9-46C6-B975-63CDE4A883A6}"/>
+                <a16:creationId xmlns:a16="http://schemas.microsoft.com/office/drawing/2014/main" xmlns="" id="{A10D3B2E-58E9-46C6-B975-63CDE4A883A6}"/>
               </a:ext>
             </a:extLst>
           </p:cNvPr>
@@ -8329,7 +8414,7 @@
           <p:cNvPr id="67" name="Título 1">
             <a:extLst>
               <a:ext uri="{FF2B5EF4-FFF2-40B4-BE49-F238E27FC236}">
-                <a16:creationId xmlns:a16="http://schemas.microsoft.com/office/drawing/2014/main" id="{2B7275B1-1189-42D4-9B65-EF30C2B13586}"/>
+                <a16:creationId xmlns:a16="http://schemas.microsoft.com/office/drawing/2014/main" xmlns="" id="{2B7275B1-1189-42D4-9B65-EF30C2B13586}"/>
               </a:ext>
             </a:extLst>
           </p:cNvPr>
@@ -8515,7 +8600,7 @@
           <p:cNvPr id="1026" name="Picture 2" descr="Adição com Material Dourado">
             <a:extLst>
               <a:ext uri="{FF2B5EF4-FFF2-40B4-BE49-F238E27FC236}">
-                <a16:creationId xmlns:a16="http://schemas.microsoft.com/office/drawing/2014/main" id="{17328EEB-4D1E-4ED2-8B88-402802781835}"/>
+                <a16:creationId xmlns:a16="http://schemas.microsoft.com/office/drawing/2014/main" xmlns="" id="{17328EEB-4D1E-4ED2-8B88-402802781835}"/>
               </a:ext>
             </a:extLst>
           </p:cNvPr>
@@ -8600,7 +8685,7 @@
           <p:cNvPr id="7" name="Picture 2" descr="Montessori Basics: How Math Progresses Through the Levels | Hollis  Montessori School, NH">
             <a:extLst>
               <a:ext uri="{FF2B5EF4-FFF2-40B4-BE49-F238E27FC236}">
-                <a16:creationId xmlns:a16="http://schemas.microsoft.com/office/drawing/2014/main" id="{A88B4583-FAEB-4370-9A3A-97C09FF55B1D}"/>
+                <a16:creationId xmlns:a16="http://schemas.microsoft.com/office/drawing/2014/main" xmlns="" id="{A88B4583-FAEB-4370-9A3A-97C09FF55B1D}"/>
               </a:ext>
             </a:extLst>
           </p:cNvPr>
@@ -8672,10 +8757,10 @@
           <p:cNvPr id="35" name="Isosceles Triangle 34">
             <a:extLst>
               <a:ext uri="{FF2B5EF4-FFF2-40B4-BE49-F238E27FC236}">
-                <a16:creationId xmlns:a16="http://schemas.microsoft.com/office/drawing/2014/main" id="{ECD25CC7-FC66-488C-8D61-0FE7ECF1615F}"/>
+                <a16:creationId xmlns:a16="http://schemas.microsoft.com/office/drawing/2014/main" xmlns="" id="{ECD25CC7-FC66-488C-8D61-0FE7ECF1615F}"/>
               </a:ext>
               <a:ext uri="{C183D7F6-B498-43B3-948B-1728B52AA6E4}">
-                <adec:decorative xmlns:adec="http://schemas.microsoft.com/office/drawing/2017/decorative" val="1"/>
+                <adec:decorative xmlns:adec="http://schemas.microsoft.com/office/drawing/2017/decorative" xmlns="" val="1"/>
               </a:ext>
             </a:extLst>
           </p:cNvPr>
@@ -8685,7 +8770,7 @@
           <p:nvPr>
             <p:extLst>
               <p:ext uri="{386F3935-93C4-4BCD-93E2-E3B085C9AB24}">
-                <p16:designElem xmlns:p16="http://schemas.microsoft.com/office/powerpoint/2015/main" val="1"/>
+                <p16:designElem xmlns:p16="http://schemas.microsoft.com/office/powerpoint/2015/main" xmlns="" val="1"/>
               </p:ext>
             </p:extLst>
           </p:nvPr>
@@ -8728,7 +8813,7 @@
           <p:cNvPr id="32" name="Content Placeholder 31">
             <a:extLst>
               <a:ext uri="{FF2B5EF4-FFF2-40B4-BE49-F238E27FC236}">
-                <a16:creationId xmlns:a16="http://schemas.microsoft.com/office/drawing/2014/main" id="{A10D3B2E-58E9-46C6-B975-63CDE4A883A6}"/>
+                <a16:creationId xmlns:a16="http://schemas.microsoft.com/office/drawing/2014/main" xmlns="" id="{A10D3B2E-58E9-46C6-B975-63CDE4A883A6}"/>
               </a:ext>
             </a:extLst>
           </p:cNvPr>
@@ -8766,7 +8851,7 @@
           <p:cNvPr id="67" name="Título 1">
             <a:extLst>
               <a:ext uri="{FF2B5EF4-FFF2-40B4-BE49-F238E27FC236}">
-                <a16:creationId xmlns:a16="http://schemas.microsoft.com/office/drawing/2014/main" id="{2B7275B1-1189-42D4-9B65-EF30C2B13586}"/>
+                <a16:creationId xmlns:a16="http://schemas.microsoft.com/office/drawing/2014/main" xmlns="" id="{2B7275B1-1189-42D4-9B65-EF30C2B13586}"/>
               </a:ext>
             </a:extLst>
           </p:cNvPr>
@@ -8931,7 +9016,7 @@
           <p:cNvPr id="4" name="Objeto 3">
             <a:extLst>
               <a:ext uri="{FF2B5EF4-FFF2-40B4-BE49-F238E27FC236}">
-                <a16:creationId xmlns:a16="http://schemas.microsoft.com/office/drawing/2014/main" id="{DA1B83C5-A8CA-486A-8AAF-89D40D475A15}"/>
+                <a16:creationId xmlns:a16="http://schemas.microsoft.com/office/drawing/2014/main" xmlns="" id="{DA1B83C5-A8CA-486A-8AAF-89D40D475A15}"/>
               </a:ext>
             </a:extLst>
           </p:cNvPr>
@@ -8954,7 +9039,7 @@
           <a:graphicData uri="http://schemas.openxmlformats.org/presentationml/2006/ole">
             <mc:AlternateContent xmlns:mc="http://schemas.openxmlformats.org/markup-compatibility/2006">
               <mc:Choice xmlns:v="urn:schemas-microsoft-com:vml" Requires="v">
-                <p:oleObj spid="_x0000_s2056" name="Imagem de Bitmap" r:id="rId4" imgW="4143240" imgH="2600280" progId="Paint.Picture">
+                <p:oleObj spid="_x0000_s2058" name="Imagem de Bitmap" r:id="rId4" imgW="4143240" imgH="2600280" progId="Paint.Picture">
                   <p:embed/>
                 </p:oleObj>
               </mc:Choice>
@@ -9032,7 +9117,7 @@
           <p:cNvPr id="7" name="Picture 2" descr="Montessori Basics: How Math Progresses Through the Levels | Hollis  Montessori School, NH">
             <a:extLst>
               <a:ext uri="{FF2B5EF4-FFF2-40B4-BE49-F238E27FC236}">
-                <a16:creationId xmlns:a16="http://schemas.microsoft.com/office/drawing/2014/main" id="{A88B4583-FAEB-4370-9A3A-97C09FF55B1D}"/>
+                <a16:creationId xmlns:a16="http://schemas.microsoft.com/office/drawing/2014/main" xmlns="" id="{A88B4583-FAEB-4370-9A3A-97C09FF55B1D}"/>
               </a:ext>
             </a:extLst>
           </p:cNvPr>
@@ -9104,10 +9189,10 @@
           <p:cNvPr id="35" name="Isosceles Triangle 34">
             <a:extLst>
               <a:ext uri="{FF2B5EF4-FFF2-40B4-BE49-F238E27FC236}">
-                <a16:creationId xmlns:a16="http://schemas.microsoft.com/office/drawing/2014/main" id="{ECD25CC7-FC66-488C-8D61-0FE7ECF1615F}"/>
+                <a16:creationId xmlns:a16="http://schemas.microsoft.com/office/drawing/2014/main" xmlns="" id="{ECD25CC7-FC66-488C-8D61-0FE7ECF1615F}"/>
               </a:ext>
               <a:ext uri="{C183D7F6-B498-43B3-948B-1728B52AA6E4}">
-                <adec:decorative xmlns:adec="http://schemas.microsoft.com/office/drawing/2017/decorative" val="1"/>
+                <adec:decorative xmlns:adec="http://schemas.microsoft.com/office/drawing/2017/decorative" xmlns="" val="1"/>
               </a:ext>
             </a:extLst>
           </p:cNvPr>
@@ -9117,7 +9202,7 @@
           <p:nvPr>
             <p:extLst>
               <p:ext uri="{386F3935-93C4-4BCD-93E2-E3B085C9AB24}">
-                <p16:designElem xmlns:p16="http://schemas.microsoft.com/office/powerpoint/2015/main" val="1"/>
+                <p16:designElem xmlns:p16="http://schemas.microsoft.com/office/powerpoint/2015/main" xmlns="" val="1"/>
               </p:ext>
             </p:extLst>
           </p:nvPr>
@@ -9160,7 +9245,7 @@
           <p:cNvPr id="32" name="Content Placeholder 31">
             <a:extLst>
               <a:ext uri="{FF2B5EF4-FFF2-40B4-BE49-F238E27FC236}">
-                <a16:creationId xmlns:a16="http://schemas.microsoft.com/office/drawing/2014/main" id="{A10D3B2E-58E9-46C6-B975-63CDE4A883A6}"/>
+                <a16:creationId xmlns:a16="http://schemas.microsoft.com/office/drawing/2014/main" xmlns="" id="{A10D3B2E-58E9-46C6-B975-63CDE4A883A6}"/>
               </a:ext>
             </a:extLst>
           </p:cNvPr>
@@ -9199,7 +9284,7 @@
           <p:cNvPr id="67" name="Título 1">
             <a:extLst>
               <a:ext uri="{FF2B5EF4-FFF2-40B4-BE49-F238E27FC236}">
-                <a16:creationId xmlns:a16="http://schemas.microsoft.com/office/drawing/2014/main" id="{2B7275B1-1189-42D4-9B65-EF30C2B13586}"/>
+                <a16:creationId xmlns:a16="http://schemas.microsoft.com/office/drawing/2014/main" xmlns="" id="{2B7275B1-1189-42D4-9B65-EF30C2B13586}"/>
               </a:ext>
             </a:extLst>
           </p:cNvPr>
@@ -9366,7 +9451,7 @@
           <p:cNvPr id="8" name="Content Placeholder 31">
             <a:extLst>
               <a:ext uri="{FF2B5EF4-FFF2-40B4-BE49-F238E27FC236}">
-                <a16:creationId xmlns:a16="http://schemas.microsoft.com/office/drawing/2014/main" id="{B19EAA7A-682C-4F18-8555-309EC4552B33}"/>
+                <a16:creationId xmlns:a16="http://schemas.microsoft.com/office/drawing/2014/main" xmlns="" id="{B19EAA7A-682C-4F18-8555-309EC4552B33}"/>
               </a:ext>
             </a:extLst>
           </p:cNvPr>
@@ -9632,7 +9717,7 @@
           <p:cNvPr id="9" name="Content Placeholder 31">
             <a:extLst>
               <a:ext uri="{FF2B5EF4-FFF2-40B4-BE49-F238E27FC236}">
-                <a16:creationId xmlns:a16="http://schemas.microsoft.com/office/drawing/2014/main" id="{6757B634-D29E-479C-92D4-2250A0862F8D}"/>
+                <a16:creationId xmlns:a16="http://schemas.microsoft.com/office/drawing/2014/main" xmlns="" id="{6757B634-D29E-479C-92D4-2250A0862F8D}"/>
               </a:ext>
             </a:extLst>
           </p:cNvPr>
@@ -9898,7 +9983,7 @@
           <p:cNvPr id="10" name="Content Placeholder 31">
             <a:extLst>
               <a:ext uri="{FF2B5EF4-FFF2-40B4-BE49-F238E27FC236}">
-                <a16:creationId xmlns:a16="http://schemas.microsoft.com/office/drawing/2014/main" id="{5C0389E6-35F6-4E58-B48D-9D5ED6EB0A38}"/>
+                <a16:creationId xmlns:a16="http://schemas.microsoft.com/office/drawing/2014/main" xmlns="" id="{5C0389E6-35F6-4E58-B48D-9D5ED6EB0A38}"/>
               </a:ext>
             </a:extLst>
           </p:cNvPr>
@@ -10164,7 +10249,7 @@
           <p:cNvPr id="12" name="Content Placeholder 31">
             <a:extLst>
               <a:ext uri="{FF2B5EF4-FFF2-40B4-BE49-F238E27FC236}">
-                <a16:creationId xmlns:a16="http://schemas.microsoft.com/office/drawing/2014/main" id="{9FF234BE-534D-460B-B5C6-F36D0509442F}"/>
+                <a16:creationId xmlns:a16="http://schemas.microsoft.com/office/drawing/2014/main" xmlns="" id="{9FF234BE-534D-460B-B5C6-F36D0509442F}"/>
               </a:ext>
             </a:extLst>
           </p:cNvPr>
@@ -10430,7 +10515,7 @@
           <p:cNvPr id="13" name="Content Placeholder 31">
             <a:extLst>
               <a:ext uri="{FF2B5EF4-FFF2-40B4-BE49-F238E27FC236}">
-                <a16:creationId xmlns:a16="http://schemas.microsoft.com/office/drawing/2014/main" id="{4EC2B86E-D5D9-4EEC-943D-0B9D559B1A66}"/>
+                <a16:creationId xmlns:a16="http://schemas.microsoft.com/office/drawing/2014/main" xmlns="" id="{4EC2B86E-D5D9-4EEC-943D-0B9D559B1A66}"/>
               </a:ext>
             </a:extLst>
           </p:cNvPr>
@@ -10729,15 +10814,87 @@
           <a:chExt cx="0" cy="0"/>
         </a:xfrm>
       </p:grpSpPr>
+      <p:pic>
+        <p:nvPicPr>
+          <p:cNvPr id="7" name="Picture 2" descr="Montessori Basics: How Math Progresses Through the Levels | Hollis  Montessori School, NH">
+            <a:extLst>
+              <a:ext uri="{FF2B5EF4-FFF2-40B4-BE49-F238E27FC236}">
+                <a16:creationId xmlns:a16="http://schemas.microsoft.com/office/drawing/2014/main" xmlns="" id="{A88B4583-FAEB-4370-9A3A-97C09FF55B1D}"/>
+              </a:ext>
+            </a:extLst>
+          </p:cNvPr>
+          <p:cNvPicPr>
+            <a:picLocks noChangeAspect="1" noChangeArrowheads="1"/>
+          </p:cNvPicPr>
+          <p:nvPr/>
+        </p:nvPicPr>
+        <p:blipFill rotWithShape="1">
+          <a:blip r:embed="rId2">
+            <a:extLst>
+              <a:ext uri="{28A0092B-C50C-407E-A947-70E740481C1C}">
+                <a14:useLocalDpi xmlns:a14="http://schemas.microsoft.com/office/drawing/2010/main" val="0"/>
+              </a:ext>
+            </a:extLst>
+          </a:blip>
+          <a:srcRect l="46252" r="29590" b="9091"/>
+          <a:stretch/>
+        </p:blipFill>
+        <p:spPr bwMode="auto">
+          <a:xfrm>
+            <a:off x="20" y="10"/>
+            <a:ext cx="2734036" cy="6867719"/>
+          </a:xfrm>
+          <a:custGeom>
+            <a:avLst/>
+            <a:gdLst/>
+            <a:ahLst/>
+            <a:cxnLst/>
+            <a:rect l="l" t="t" r="r" b="b"/>
+            <a:pathLst>
+              <a:path w="2734056" h="6858000">
+                <a:moveTo>
+                  <a:pt x="0" y="0"/>
+                </a:moveTo>
+                <a:lnTo>
+                  <a:pt x="1674254" y="0"/>
+                </a:lnTo>
+                <a:lnTo>
+                  <a:pt x="2734056" y="6850199"/>
+                </a:lnTo>
+                <a:lnTo>
+                  <a:pt x="2734056" y="6858000"/>
+                </a:lnTo>
+                <a:lnTo>
+                  <a:pt x="461457" y="6858000"/>
+                </a:lnTo>
+                <a:lnTo>
+                  <a:pt x="0" y="4134118"/>
+                </a:lnTo>
+                <a:close/>
+              </a:path>
+            </a:pathLst>
+          </a:custGeom>
+          <a:noFill/>
+          <a:extLst>
+            <a:ext uri="{909E8E84-426E-40DD-AFC4-6F175D3DCCD1}">
+              <a14:hiddenFill xmlns:a14="http://schemas.microsoft.com/office/drawing/2010/main">
+                <a:solidFill>
+                  <a:srgbClr val="FFFFFF"/>
+                </a:solidFill>
+              </a14:hiddenFill>
+            </a:ext>
+          </a:extLst>
+        </p:spPr>
+      </p:pic>
       <p:sp>
         <p:nvSpPr>
           <p:cNvPr id="35" name="Isosceles Triangle 34">
             <a:extLst>
               <a:ext uri="{FF2B5EF4-FFF2-40B4-BE49-F238E27FC236}">
-                <a16:creationId xmlns:a16="http://schemas.microsoft.com/office/drawing/2014/main" id="{ECD25CC7-FC66-488C-8D61-0FE7ECF1615F}"/>
+                <a16:creationId xmlns:a16="http://schemas.microsoft.com/office/drawing/2014/main" xmlns="" id="{ECD25CC7-FC66-488C-8D61-0FE7ECF1615F}"/>
               </a:ext>
               <a:ext uri="{C183D7F6-B498-43B3-948B-1728B52AA6E4}">
-                <adec:decorative xmlns:adec="http://schemas.microsoft.com/office/drawing/2017/decorative" val="1"/>
+                <adec:decorative xmlns:adec="http://schemas.microsoft.com/office/drawing/2017/decorative" xmlns="" val="1"/>
               </a:ext>
             </a:extLst>
           </p:cNvPr>
@@ -10747,7 +10904,7 @@
           <p:nvPr>
             <p:extLst>
               <p:ext uri="{386F3935-93C4-4BCD-93E2-E3B085C9AB24}">
-                <p16:designElem xmlns:p16="http://schemas.microsoft.com/office/powerpoint/2015/main" val="1"/>
+                <p16:designElem xmlns:p16="http://schemas.microsoft.com/office/powerpoint/2015/main" xmlns="" val="1"/>
               </p:ext>
             </p:extLst>
           </p:nvPr>
@@ -10790,7 +10947,322 @@
           <p:cNvPr id="67" name="Título 1">
             <a:extLst>
               <a:ext uri="{FF2B5EF4-FFF2-40B4-BE49-F238E27FC236}">
-                <a16:creationId xmlns:a16="http://schemas.microsoft.com/office/drawing/2014/main" id="{2B7275B1-1189-42D4-9B65-EF30C2B13586}"/>
+                <a16:creationId xmlns:a16="http://schemas.microsoft.com/office/drawing/2014/main" xmlns="" id="{2B7275B1-1189-42D4-9B65-EF30C2B13586}"/>
+              </a:ext>
+            </a:extLst>
+          </p:cNvPr>
+          <p:cNvSpPr txBox="1">
+            <a:spLocks/>
+          </p:cNvSpPr>
+          <p:nvPr/>
+        </p:nvSpPr>
+        <p:spPr>
+          <a:xfrm>
+            <a:off x="2062163" y="419100"/>
+            <a:ext cx="8596312" cy="1320800"/>
+          </a:xfrm>
+          <a:prstGeom prst="rect">
+            <a:avLst/>
+          </a:prstGeom>
+        </p:spPr>
+        <p:txBody>
+          <a:bodyPr vert="horz" lIns="91440" tIns="45720" rIns="91440" bIns="45720" rtlCol="0" anchor="t">
+            <a:normAutofit fontScale="82500" lnSpcReduction="20000"/>
+          </a:bodyPr>
+          <a:lstStyle>
+            <a:lvl1pPr algn="l" defTabSz="457200" rtl="0" eaLnBrk="1" latinLnBrk="0" hangingPunct="1">
+              <a:spcBef>
+                <a:spcPct val="0"/>
+              </a:spcBef>
+              <a:buNone/>
+              <a:defRPr sz="3600" kern="1200">
+                <a:solidFill>
+                  <a:schemeClr val="accent1"/>
+                </a:solidFill>
+                <a:latin typeface="+mj-lt"/>
+                <a:ea typeface="+mj-ea"/>
+                <a:cs typeface="+mj-cs"/>
+              </a:defRPr>
+            </a:lvl1pPr>
+            <a:lvl2pPr eaLnBrk="1" hangingPunct="1">
+              <a:defRPr>
+                <a:solidFill>
+                  <a:schemeClr val="tx2"/>
+                </a:solidFill>
+              </a:defRPr>
+            </a:lvl2pPr>
+            <a:lvl3pPr eaLnBrk="1" hangingPunct="1">
+              <a:defRPr>
+                <a:solidFill>
+                  <a:schemeClr val="tx2"/>
+                </a:solidFill>
+              </a:defRPr>
+            </a:lvl3pPr>
+            <a:lvl4pPr eaLnBrk="1" hangingPunct="1">
+              <a:defRPr>
+                <a:solidFill>
+                  <a:schemeClr val="tx2"/>
+                </a:solidFill>
+              </a:defRPr>
+            </a:lvl4pPr>
+            <a:lvl5pPr eaLnBrk="1" hangingPunct="1">
+              <a:defRPr>
+                <a:solidFill>
+                  <a:schemeClr val="tx2"/>
+                </a:solidFill>
+              </a:defRPr>
+            </a:lvl5pPr>
+            <a:lvl6pPr eaLnBrk="1" hangingPunct="1">
+              <a:defRPr>
+                <a:solidFill>
+                  <a:schemeClr val="tx2"/>
+                </a:solidFill>
+              </a:defRPr>
+            </a:lvl6pPr>
+            <a:lvl7pPr eaLnBrk="1" hangingPunct="1">
+              <a:defRPr>
+                <a:solidFill>
+                  <a:schemeClr val="tx2"/>
+                </a:solidFill>
+              </a:defRPr>
+            </a:lvl7pPr>
+            <a:lvl8pPr eaLnBrk="1" hangingPunct="1">
+              <a:defRPr>
+                <a:solidFill>
+                  <a:schemeClr val="tx2"/>
+                </a:solidFill>
+              </a:defRPr>
+            </a:lvl8pPr>
+            <a:lvl9pPr eaLnBrk="1" hangingPunct="1">
+              <a:defRPr>
+                <a:solidFill>
+                  <a:schemeClr val="tx2"/>
+                </a:solidFill>
+              </a:defRPr>
+            </a:lvl9pPr>
+          </a:lstStyle>
+          <a:p>
+            <a:r>
+              <a:rPr lang="pt-BR" sz="5400" dirty="0">
+                <a:ln w="12700">
+                  <a:solidFill>
+                    <a:schemeClr val="tx1"/>
+                  </a:solidFill>
+                </a:ln>
+                <a:solidFill>
+                  <a:schemeClr val="accent1">
+                    <a:lumMod val="60000"/>
+                    <a:lumOff val="40000"/>
+                  </a:schemeClr>
+                </a:solidFill>
+                <a:latin typeface="Modak" panose="01000000000000000000" pitchFamily="2" charset="0"/>
+                <a:cs typeface="Modak" panose="01000000000000000000" pitchFamily="2" charset="0"/>
+              </a:rPr>
+              <a:t>FUNDAMENTOS:</a:t>
+            </a:r>
+            <a:br>
+              <a:rPr lang="pt-BR" sz="5400" dirty="0">
+                <a:ln w="12700">
+                  <a:solidFill>
+                    <a:schemeClr val="tx1"/>
+                  </a:solidFill>
+                </a:ln>
+                <a:solidFill>
+                  <a:schemeClr val="accent1">
+                    <a:lumMod val="60000"/>
+                    <a:lumOff val="40000"/>
+                  </a:schemeClr>
+                </a:solidFill>
+                <a:latin typeface="Modak" panose="01000000000000000000" pitchFamily="2" charset="0"/>
+                <a:cs typeface="Modak" panose="01000000000000000000" pitchFamily="2" charset="0"/>
+              </a:rPr>
+            </a:br>
+            <a:r>
+              <a:rPr lang="pt-BR" sz="5400" dirty="0" smtClean="0">
+                <a:ln w="12700">
+                  <a:solidFill>
+                    <a:schemeClr val="tx1"/>
+                  </a:solidFill>
+                </a:ln>
+                <a:solidFill>
+                  <a:srgbClr val="25F5DC"/>
+                </a:solidFill>
+                <a:latin typeface="Modak" panose="01000000000000000000" pitchFamily="2" charset="0"/>
+                <a:cs typeface="Modak" panose="01000000000000000000" pitchFamily="2" charset="0"/>
+              </a:rPr>
+              <a:t>PROGRESSÃO </a:t>
+            </a:r>
+            <a:r>
+              <a:rPr lang="pt-BR" sz="5500" dirty="0">
+                <a:ln w="12700">
+                  <a:solidFill>
+                    <a:schemeClr val="tx1"/>
+                  </a:solidFill>
+                </a:ln>
+                <a:solidFill>
+                  <a:srgbClr val="F5EA14"/>
+                </a:solidFill>
+                <a:latin typeface="Modak" panose="01000000000000000000" pitchFamily="2" charset="0"/>
+              </a:rPr>
+              <a:t>DO JOGO</a:t>
+            </a:r>
+          </a:p>
+        </p:txBody>
+      </p:sp>
+      <p:pic>
+        <p:nvPicPr>
+          <p:cNvPr id="3075" name="Picture 3"/>
+          <p:cNvPicPr>
+            <a:picLocks noChangeAspect="1" noChangeArrowheads="1"/>
+          </p:cNvPicPr>
+          <p:nvPr/>
+        </p:nvPicPr>
+        <p:blipFill>
+          <a:blip r:embed="rId3">
+            <a:extLst>
+              <a:ext uri="{28A0092B-C50C-407E-A947-70E740481C1C}">
+                <a14:useLocalDpi xmlns:a14="http://schemas.microsoft.com/office/drawing/2010/main" val="0"/>
+              </a:ext>
+            </a:extLst>
+          </a:blip>
+          <a:srcRect/>
+          <a:stretch>
+            <a:fillRect/>
+          </a:stretch>
+        </p:blipFill>
+        <p:spPr bwMode="auto">
+          <a:xfrm>
+            <a:off x="1866900" y="1521115"/>
+            <a:ext cx="7973786" cy="5336885"/>
+          </a:xfrm>
+          <a:prstGeom prst="rect">
+            <a:avLst/>
+          </a:prstGeom>
+          <a:noFill/>
+          <a:ln>
+            <a:noFill/>
+          </a:ln>
+          <a:extLst>
+            <a:ext uri="{909E8E84-426E-40DD-AFC4-6F175D3DCCD1}">
+              <a14:hiddenFill xmlns:a14="http://schemas.microsoft.com/office/drawing/2010/main">
+                <a:solidFill>
+                  <a:schemeClr val="accent1"/>
+                </a:solidFill>
+              </a14:hiddenFill>
+            </a:ext>
+            <a:ext uri="{91240B29-F687-4F45-9708-019B960494DF}">
+              <a14:hiddenLine xmlns:a14="http://schemas.microsoft.com/office/drawing/2010/main" w="9525">
+                <a:solidFill>
+                  <a:schemeClr val="tx1"/>
+                </a:solidFill>
+                <a:miter lim="800000"/>
+                <a:headEnd/>
+                <a:tailEnd/>
+              </a14:hiddenLine>
+            </a:ext>
+          </a:extLst>
+        </p:spPr>
+      </p:pic>
+    </p:spTree>
+    <p:extLst>
+      <p:ext uri="{BB962C8B-B14F-4D97-AF65-F5344CB8AC3E}">
+        <p14:creationId xmlns:p14="http://schemas.microsoft.com/office/powerpoint/2010/main" val="2971090785"/>
+      </p:ext>
+    </p:extLst>
+  </p:cSld>
+  <p:clrMapOvr>
+    <a:masterClrMapping/>
+  </p:clrMapOvr>
+</p:sld>
+</file>
+
+<file path=ppt/slides/slide7.xml><?xml version="1.0" encoding="utf-8"?>
+<p:sld xmlns:a="http://schemas.openxmlformats.org/drawingml/2006/main" xmlns:r="http://schemas.openxmlformats.org/officeDocument/2006/relationships" xmlns:p="http://schemas.openxmlformats.org/presentationml/2006/main">
+  <p:cSld>
+    <p:bg>
+      <p:bgPr>
+        <a:solidFill>
+          <a:schemeClr val="bg1"/>
+        </a:solidFill>
+        <a:effectLst/>
+      </p:bgPr>
+    </p:bg>
+    <p:spTree>
+      <p:nvGrpSpPr>
+        <p:cNvPr id="1" name=""/>
+        <p:cNvGrpSpPr/>
+        <p:nvPr/>
+      </p:nvGrpSpPr>
+      <p:grpSpPr>
+        <a:xfrm>
+          <a:off x="0" y="0"/>
+          <a:ext cx="0" cy="0"/>
+          <a:chOff x="0" y="0"/>
+          <a:chExt cx="0" cy="0"/>
+        </a:xfrm>
+      </p:grpSpPr>
+      <p:sp>
+        <p:nvSpPr>
+          <p:cNvPr id="35" name="Isosceles Triangle 34">
+            <a:extLst>
+              <a:ext uri="{FF2B5EF4-FFF2-40B4-BE49-F238E27FC236}">
+                <a16:creationId xmlns:a16="http://schemas.microsoft.com/office/drawing/2014/main" xmlns="" id="{ECD25CC7-FC66-488C-8D61-0FE7ECF1615F}"/>
+              </a:ext>
+              <a:ext uri="{C183D7F6-B498-43B3-948B-1728B52AA6E4}">
+                <adec:decorative xmlns:adec="http://schemas.microsoft.com/office/drawing/2017/decorative" xmlns="" val="1"/>
+              </a:ext>
+            </a:extLst>
+          </p:cNvPr>
+          <p:cNvSpPr>
+            <a:spLocks noGrp="1" noRot="1" noChangeAspect="1" noMove="1" noResize="1" noEditPoints="1" noAdjustHandles="1" noChangeArrowheads="1" noChangeShapeType="1" noTextEdit="1"/>
+          </p:cNvSpPr>
+          <p:nvPr>
+            <p:extLst>
+              <p:ext uri="{386F3935-93C4-4BCD-93E2-E3B085C9AB24}">
+                <p16:designElem xmlns:p16="http://schemas.microsoft.com/office/powerpoint/2015/main" xmlns="" val="1"/>
+              </p:ext>
+            </p:extLst>
+          </p:nvPr>
+        </p:nvSpPr>
+        <p:spPr>
+          <a:xfrm>
+            <a:off x="0" y="4013201"/>
+            <a:ext cx="476655" cy="2844800"/>
+          </a:xfrm>
+          <a:prstGeom prst="triangle">
+            <a:avLst>
+              <a:gd name="adj" fmla="val 0"/>
+            </a:avLst>
+          </a:prstGeom>
+          <a:solidFill>
+            <a:schemeClr val="accent1"/>
+          </a:solidFill>
+          <a:ln>
+            <a:noFill/>
+          </a:ln>
+          <a:effectLst/>
+        </p:spPr>
+        <p:style>
+          <a:lnRef idx="1">
+            <a:schemeClr val="accent1"/>
+          </a:lnRef>
+          <a:fillRef idx="3">
+            <a:schemeClr val="accent1"/>
+          </a:fillRef>
+          <a:effectRef idx="2">
+            <a:schemeClr val="accent1"/>
+          </a:effectRef>
+          <a:fontRef idx="minor">
+            <a:schemeClr val="lt1"/>
+          </a:fontRef>
+        </p:style>
+      </p:sp>
+      <p:sp>
+        <p:nvSpPr>
+          <p:cNvPr id="67" name="Título 1">
+            <a:extLst>
+              <a:ext uri="{FF2B5EF4-FFF2-40B4-BE49-F238E27FC236}">
+                <a16:creationId xmlns:a16="http://schemas.microsoft.com/office/drawing/2014/main" xmlns="" id="{2B7275B1-1189-42D4-9B65-EF30C2B13586}"/>
               </a:ext>
             </a:extLst>
           </p:cNvPr>
@@ -10810,7 +11282,7 @@
         </p:spPr>
         <p:txBody>
           <a:bodyPr vert="horz" lIns="91440" tIns="45720" rIns="91440" bIns="45720" rtlCol="0" anchor="t">
-            <a:normAutofit fontScale="97500"/>
+            <a:normAutofit fontScale="90000" lnSpcReduction="20000"/>
           </a:bodyPr>
           <a:lstStyle>
             <a:lvl1pPr algn="l" defTabSz="457200" rtl="0" eaLnBrk="1" latinLnBrk="0" hangingPunct="1">
@@ -10940,7 +11412,7 @@
           <p:cNvPr id="5" name="Imagem 4">
             <a:extLst>
               <a:ext uri="{FF2B5EF4-FFF2-40B4-BE49-F238E27FC236}">
-                <a16:creationId xmlns:a16="http://schemas.microsoft.com/office/drawing/2014/main" id="{3C74F606-7A91-4778-BF60-A91F0B8C21AA}"/>
+                <a16:creationId xmlns:a16="http://schemas.microsoft.com/office/drawing/2014/main" xmlns="" id="{3C74F606-7A91-4778-BF60-A91F0B8C21AA}"/>
               </a:ext>
             </a:extLst>
           </p:cNvPr>
@@ -10970,7 +11442,7 @@
           <p:cNvPr id="15" name="Imagem 14">
             <a:extLst>
               <a:ext uri="{FF2B5EF4-FFF2-40B4-BE49-F238E27FC236}">
-                <a16:creationId xmlns:a16="http://schemas.microsoft.com/office/drawing/2014/main" id="{89AEBEAC-F00B-4390-BBFF-81996801EE11}"/>
+                <a16:creationId xmlns:a16="http://schemas.microsoft.com/office/drawing/2014/main" xmlns="" id="{89AEBEAC-F00B-4390-BBFF-81996801EE11}"/>
               </a:ext>
             </a:extLst>
           </p:cNvPr>
@@ -11000,7 +11472,7 @@
           <p:cNvPr id="19" name="Título 1">
             <a:extLst>
               <a:ext uri="{FF2B5EF4-FFF2-40B4-BE49-F238E27FC236}">
-                <a16:creationId xmlns:a16="http://schemas.microsoft.com/office/drawing/2014/main" id="{11C1123A-0B42-47AB-A10B-39C86EC5872D}"/>
+                <a16:creationId xmlns:a16="http://schemas.microsoft.com/office/drawing/2014/main" xmlns="" id="{11C1123A-0B42-47AB-A10B-39C86EC5872D}"/>
               </a:ext>
             </a:extLst>
           </p:cNvPr>
@@ -11020,7 +11492,7 @@
         </p:spPr>
         <p:txBody>
           <a:bodyPr vert="horz" lIns="91440" tIns="45720" rIns="91440" bIns="45720" rtlCol="0" anchor="t">
-            <a:normAutofit fontScale="97500"/>
+            <a:normAutofit fontScale="90000"/>
           </a:bodyPr>
           <a:lstStyle>
             <a:lvl1pPr algn="l" defTabSz="457200" rtl="0" eaLnBrk="1" latinLnBrk="0" hangingPunct="1">
@@ -11117,7 +11589,7 @@
           <p:cNvPr id="20" name="Título 1">
             <a:extLst>
               <a:ext uri="{FF2B5EF4-FFF2-40B4-BE49-F238E27FC236}">
-                <a16:creationId xmlns:a16="http://schemas.microsoft.com/office/drawing/2014/main" id="{EC2EEF05-A6DF-4B35-9D57-A29B4407E586}"/>
+                <a16:creationId xmlns:a16="http://schemas.microsoft.com/office/drawing/2014/main" xmlns="" id="{EC2EEF05-A6DF-4B35-9D57-A29B4407E586}"/>
               </a:ext>
             </a:extLst>
           </p:cNvPr>
@@ -11137,7 +11609,7 @@
         </p:spPr>
         <p:txBody>
           <a:bodyPr vert="horz" lIns="91440" tIns="45720" rIns="91440" bIns="45720" rtlCol="0" anchor="t">
-            <a:normAutofit fontScale="97500"/>
+            <a:normAutofit fontScale="90000"/>
           </a:bodyPr>
           <a:lstStyle>
             <a:lvl1pPr algn="l" defTabSz="457200" rtl="0" eaLnBrk="1" latinLnBrk="0" hangingPunct="1">
@@ -11234,7 +11706,7 @@
           <p:cNvPr id="31" name="Gráfico 30" descr="Seta: reta com preenchimento sólido">
             <a:extLst>
               <a:ext uri="{FF2B5EF4-FFF2-40B4-BE49-F238E27FC236}">
-                <a16:creationId xmlns:a16="http://schemas.microsoft.com/office/drawing/2014/main" id="{59A05852-A858-4F27-8058-7AB1868ACDEE}"/>
+                <a16:creationId xmlns:a16="http://schemas.microsoft.com/office/drawing/2014/main" xmlns="" id="{59A05852-A858-4F27-8058-7AB1868ACDEE}"/>
               </a:ext>
             </a:extLst>
           </p:cNvPr>
@@ -11244,13 +11716,13 @@
           <p:nvPr/>
         </p:nvPicPr>
         <p:blipFill>
-          <a:blip r:embed="rId4">
+          <a:blip r:embed="rId4" cstate="print">
             <a:extLst>
               <a:ext uri="{28A0092B-C50C-407E-A947-70E740481C1C}">
                 <a14:useLocalDpi xmlns:a14="http://schemas.microsoft.com/office/drawing/2010/main" val="0"/>
               </a:ext>
               <a:ext uri="{96DAC541-7B7A-43D3-8B79-37D633B846F1}">
-                <asvg:svgBlip xmlns:asvg="http://schemas.microsoft.com/office/drawing/2016/SVG/main" r:embed="rId5"/>
+                <asvg:svgBlip xmlns:asvg="http://schemas.microsoft.com/office/drawing/2016/SVG/main" xmlns="" r:embed="rId5"/>
               </a:ext>
             </a:extLst>
           </a:blip>
@@ -11273,7 +11745,7 @@
           <p:cNvPr id="36" name="Gráfico 35" descr="Seta: reta com preenchimento sólido">
             <a:extLst>
               <a:ext uri="{FF2B5EF4-FFF2-40B4-BE49-F238E27FC236}">
-                <a16:creationId xmlns:a16="http://schemas.microsoft.com/office/drawing/2014/main" id="{F400994D-46A2-4B3D-86BA-1B96D4AC5141}"/>
+                <a16:creationId xmlns:a16="http://schemas.microsoft.com/office/drawing/2014/main" xmlns="" id="{F400994D-46A2-4B3D-86BA-1B96D4AC5141}"/>
               </a:ext>
             </a:extLst>
           </p:cNvPr>
@@ -11283,13 +11755,13 @@
           <p:nvPr/>
         </p:nvPicPr>
         <p:blipFill>
-          <a:blip r:embed="rId6">
+          <a:blip r:embed="rId6" cstate="print">
             <a:extLst>
               <a:ext uri="{28A0092B-C50C-407E-A947-70E740481C1C}">
                 <a14:useLocalDpi xmlns:a14="http://schemas.microsoft.com/office/drawing/2010/main" val="0"/>
               </a:ext>
               <a:ext uri="{96DAC541-7B7A-43D3-8B79-37D633B846F1}">
-                <asvg:svgBlip xmlns:asvg="http://schemas.microsoft.com/office/drawing/2016/SVG/main" r:embed="rId7"/>
+                <asvg:svgBlip xmlns:asvg="http://schemas.microsoft.com/office/drawing/2016/SVG/main" xmlns="" r:embed="rId7"/>
               </a:ext>
             </a:extLst>
           </a:blip>
@@ -11320,7 +11792,7 @@
 </p:sld>
 </file>
 
-<file path=ppt/slides/slide7.xml><?xml version="1.0" encoding="utf-8"?>
+<file path=ppt/slides/slide8.xml><?xml version="1.0" encoding="utf-8"?>
 <p:sld xmlns:a="http://schemas.openxmlformats.org/drawingml/2006/main" xmlns:r="http://schemas.openxmlformats.org/officeDocument/2006/relationships" xmlns:p="http://schemas.openxmlformats.org/presentationml/2006/main">
   <p:cSld>
     <p:spTree>
@@ -11404,7 +11876,7 @@
 </p:sld>
 </file>
 
-<file path=ppt/slides/slide8.xml><?xml version="1.0" encoding="utf-8"?>
+<file path=ppt/slides/slide9.xml><?xml version="1.0" encoding="utf-8"?>
 <p:sld xmlns:a="http://schemas.openxmlformats.org/drawingml/2006/main" xmlns:r="http://schemas.openxmlformats.org/officeDocument/2006/relationships" xmlns:p="http://schemas.openxmlformats.org/presentationml/2006/main">
   <p:cSld>
     <p:spTree>
@@ -11479,90 +11951,6 @@
     <p:extLst>
       <p:ext uri="{BB962C8B-B14F-4D97-AF65-F5344CB8AC3E}">
         <p14:creationId xmlns:p14="http://schemas.microsoft.com/office/powerpoint/2010/main" val="137751297"/>
-      </p:ext>
-    </p:extLst>
-  </p:cSld>
-  <p:clrMapOvr>
-    <a:masterClrMapping/>
-  </p:clrMapOvr>
-</p:sld>
-</file>
-
-<file path=ppt/slides/slide9.xml><?xml version="1.0" encoding="utf-8"?>
-<p:sld xmlns:a="http://schemas.openxmlformats.org/drawingml/2006/main" xmlns:r="http://schemas.openxmlformats.org/officeDocument/2006/relationships" xmlns:p="http://schemas.openxmlformats.org/presentationml/2006/main">
-  <p:cSld>
-    <p:spTree>
-      <p:nvGrpSpPr>
-        <p:cNvPr id="1" name=""/>
-        <p:cNvGrpSpPr/>
-        <p:nvPr/>
-      </p:nvGrpSpPr>
-      <p:grpSpPr>
-        <a:xfrm>
-          <a:off x="0" y="0"/>
-          <a:ext cx="0" cy="0"/>
-          <a:chOff x="0" y="0"/>
-          <a:chExt cx="0" cy="0"/>
-        </a:xfrm>
-      </p:grpSpPr>
-      <p:pic>
-        <p:nvPicPr>
-          <p:cNvPr id="4098" name="Picture 2"/>
-          <p:cNvPicPr>
-            <a:picLocks noChangeAspect="1" noChangeArrowheads="1"/>
-          </p:cNvPicPr>
-          <p:nvPr/>
-        </p:nvPicPr>
-        <p:blipFill>
-          <a:blip r:embed="rId2">
-            <a:extLst>
-              <a:ext uri="{28A0092B-C50C-407E-A947-70E740481C1C}">
-                <a14:useLocalDpi xmlns:a14="http://schemas.microsoft.com/office/drawing/2010/main" val="0"/>
-              </a:ext>
-            </a:extLst>
-          </a:blip>
-          <a:srcRect/>
-          <a:stretch>
-            <a:fillRect/>
-          </a:stretch>
-        </p:blipFill>
-        <p:spPr bwMode="auto">
-          <a:xfrm>
-            <a:off x="-1" y="365760"/>
-            <a:ext cx="12181867" cy="6492239"/>
-          </a:xfrm>
-          <a:prstGeom prst="rect">
-            <a:avLst/>
-          </a:prstGeom>
-          <a:noFill/>
-          <a:ln>
-            <a:noFill/>
-          </a:ln>
-          <a:extLst>
-            <a:ext uri="{909E8E84-426E-40DD-AFC4-6F175D3DCCD1}">
-              <a14:hiddenFill xmlns:a14="http://schemas.microsoft.com/office/drawing/2010/main">
-                <a:solidFill>
-                  <a:schemeClr val="accent1"/>
-                </a:solidFill>
-              </a14:hiddenFill>
-            </a:ext>
-            <a:ext uri="{91240B29-F687-4F45-9708-019B960494DF}">
-              <a14:hiddenLine xmlns:a14="http://schemas.microsoft.com/office/drawing/2010/main" w="9525">
-                <a:solidFill>
-                  <a:schemeClr val="tx1"/>
-                </a:solidFill>
-                <a:miter lim="800000"/>
-                <a:headEnd/>
-                <a:tailEnd/>
-              </a14:hiddenLine>
-            </a:ext>
-          </a:extLst>
-        </p:spPr>
-      </p:pic>
-    </p:spTree>
-    <p:extLst>
-      <p:ext uri="{BB962C8B-B14F-4D97-AF65-F5344CB8AC3E}">
-        <p14:creationId xmlns:p14="http://schemas.microsoft.com/office/powerpoint/2010/main" val="2371170962"/>
       </p:ext>
     </p:extLst>
   </p:cSld>
@@ -11823,7 +12211,7 @@
   <a:extraClrSchemeLst/>
   <a:extLst>
     <a:ext uri="{05A4C25C-085E-4340-85A3-A5531E510DB2}">
-      <thm15:themeFamily xmlns:thm15="http://schemas.microsoft.com/office/thememl/2012/main" name="Facet" id="{C0C680CD-088A-49FC-A102-D699147F32B2}" vid="{0B5AB586-D108-4FC1-8368-649FE654B894}"/>
+      <thm15:themeFamily xmlns:thm15="http://schemas.microsoft.com/office/thememl/2012/main" xmlns="" name="Facet" id="{C0C680CD-088A-49FC-A102-D699147F32B2}" vid="{0B5AB586-D108-4FC1-8368-649FE654B894}"/>
     </a:ext>
   </a:extLst>
 </a:theme>
@@ -12118,7 +12506,7 @@
   <a:extraClrSchemeLst/>
   <a:extLst>
     <a:ext uri="{05A4C25C-085E-4340-85A3-A5531E510DB2}">
-      <thm15:themeFamily xmlns:thm15="http://schemas.microsoft.com/office/thememl/2012/main" name="Office Theme" id="{62F939B6-93AF-4DB8-9C6B-D6C7DFDC589F}" vid="{4A3C46E8-61CC-4603-A589-7422A47A8E4A}"/>
+      <thm15:themeFamily xmlns:thm15="http://schemas.microsoft.com/office/thememl/2012/main" xmlns="" name="Office Theme" id="{62F939B6-93AF-4DB8-9C6B-D6C7DFDC589F}" vid="{4A3C46E8-61CC-4603-A589-7422A47A8E4A}"/>
     </a:ext>
   </a:extLst>
 </a:theme>

</xml_diff>